<commit_message>
Added Lecture 3 ML
</commit_message>
<xml_diff>
--- a/CSE 411 Machine Learning/CSE_411_ML_Ch_3 (1).pptx
+++ b/CSE 411 Machine Learning/CSE_411_ML_Ch_3 (1).pptx
@@ -34,7 +34,8 @@
     <p:sldId id="274" r:id="rId28"/>
     <p:sldId id="275" r:id="rId29"/>
     <p:sldId id="276" r:id="rId30"/>
-    <p:sldId id="277" r:id="rId31"/>
+    <p:sldId id="286" r:id="rId31"/>
+    <p:sldId id="277" r:id="rId32"/>
   </p:sldIdLst>
   <p:sldSz cx="5765800" cy="3244850"/>
   <p:notesSz cx="5765800" cy="3244850"/>
@@ -41696,6 +41697,63 @@
           </a:p>
         </p:txBody>
       </p:sp>
+      <p:sp>
+        <p:nvSpPr>
+          <p:cNvPr id="32" name="object 28">
+            <a:extLst>
+              <a:ext uri="{FF2B5EF4-FFF2-40B4-BE49-F238E27FC236}">
+                <a16:creationId xmlns:a16="http://schemas.microsoft.com/office/drawing/2014/main" id="{198D3B20-ED56-41AF-B6B0-36C00FC4514E}"/>
+              </a:ext>
+            </a:extLst>
+          </p:cNvPr>
+          <p:cNvSpPr txBox="1"/>
+          <p:nvPr/>
+        </p:nvSpPr>
+        <p:spPr>
+          <a:xfrm>
+            <a:off x="442700" y="814872"/>
+            <a:ext cx="4845050" cy="180819"/>
+          </a:xfrm>
+          <a:prstGeom prst="rect">
+            <a:avLst/>
+          </a:prstGeom>
+        </p:spPr>
+        <p:txBody>
+          <a:bodyPr vert="horz" wrap="square" lIns="0" tIns="11430" rIns="0" bIns="0" rtlCol="0">
+            <a:spAutoFit/>
+          </a:bodyPr>
+          <a:lstStyle/>
+          <a:p>
+            <a:pPr marL="187960" indent="-175260">
+              <a:lnSpc>
+                <a:spcPct val="100000"/>
+              </a:lnSpc>
+              <a:spcBef>
+                <a:spcPts val="90"/>
+              </a:spcBef>
+              <a:buClr>
+                <a:srgbClr val="DCB413"/>
+              </a:buClr>
+              <a:buFont typeface="Arial"/>
+              <a:buChar char="■"/>
+              <a:tabLst>
+                <a:tab pos="187960" algn="l"/>
+              </a:tabLst>
+            </a:pPr>
+            <a:r>
+              <a:rPr lang="en-US" sz="1100" dirty="0">
+                <a:latin typeface="Georgia"/>
+                <a:cs typeface="Georgia"/>
+              </a:rPr>
+              <a:t>To generate an association rule</a:t>
+            </a:r>
+            <a:endParaRPr sz="1100" dirty="0">
+              <a:latin typeface="Georgia"/>
+              <a:cs typeface="Georgia"/>
+            </a:endParaRPr>
+          </a:p>
+        </p:txBody>
+      </p:sp>
     </p:spTree>
   </p:cSld>
   <p:clrMapOvr>
@@ -42189,6 +42247,2401 @@
 </file>
 
 <file path=ppt/slides/slide30.xml><?xml version="1.0" encoding="utf-8"?>
+<p:sld xmlns:a="http://schemas.openxmlformats.org/drawingml/2006/main" xmlns:r="http://schemas.openxmlformats.org/officeDocument/2006/relationships" xmlns:p="http://schemas.openxmlformats.org/presentationml/2006/main">
+  <p:cSld>
+    <p:spTree>
+      <p:nvGrpSpPr>
+        <p:cNvPr id="1" name=""/>
+        <p:cNvGrpSpPr/>
+        <p:nvPr/>
+      </p:nvGrpSpPr>
+      <p:grpSpPr>
+        <a:xfrm>
+          <a:off x="0" y="0"/>
+          <a:ext cx="0" cy="0"/>
+          <a:chOff x="0" y="0"/>
+          <a:chExt cx="0" cy="0"/>
+        </a:xfrm>
+      </p:grpSpPr>
+      <p:sp>
+        <p:nvSpPr>
+          <p:cNvPr id="2" name="object 2"/>
+          <p:cNvSpPr txBox="1"/>
+          <p:nvPr/>
+        </p:nvSpPr>
+        <p:spPr>
+          <a:xfrm>
+            <a:off x="95300" y="25252"/>
+            <a:ext cx="866140" cy="116839"/>
+          </a:xfrm>
+          <a:prstGeom prst="rect">
+            <a:avLst/>
+          </a:prstGeom>
+        </p:spPr>
+        <p:txBody>
+          <a:bodyPr vert="horz" wrap="square" lIns="0" tIns="12065" rIns="0" bIns="0" rtlCol="0">
+            <a:spAutoFit/>
+          </a:bodyPr>
+          <a:lstStyle/>
+          <a:p>
+            <a:pPr marL="12700">
+              <a:lnSpc>
+                <a:spcPct val="100000"/>
+              </a:lnSpc>
+              <a:spcBef>
+                <a:spcPts val="95"/>
+              </a:spcBef>
+            </a:pPr>
+            <a:r>
+              <a:rPr sz="600" dirty="0">
+                <a:solidFill>
+                  <a:srgbClr val="F2E4AC"/>
+                </a:solidFill>
+                <a:latin typeface="LM Sans 8"/>
+                <a:cs typeface="LM Sans 8"/>
+                <a:hlinkClick r:id="rId2" action="ppaction://hlinksldjump"/>
+              </a:rPr>
+              <a:t>Probability</a:t>
+            </a:r>
+            <a:r>
+              <a:rPr sz="600" spc="-10" dirty="0">
+                <a:solidFill>
+                  <a:srgbClr val="F2E4AC"/>
+                </a:solidFill>
+                <a:latin typeface="LM Sans 8"/>
+                <a:cs typeface="LM Sans 8"/>
+                <a:hlinkClick r:id="rId2" action="ppaction://hlinksldjump"/>
+              </a:rPr>
+              <a:t> </a:t>
+            </a:r>
+            <a:r>
+              <a:rPr sz="600" dirty="0">
+                <a:solidFill>
+                  <a:srgbClr val="F2E4AC"/>
+                </a:solidFill>
+                <a:latin typeface="LM Sans 8"/>
+                <a:cs typeface="LM Sans 8"/>
+                <a:hlinkClick r:id="rId2" action="ppaction://hlinksldjump"/>
+              </a:rPr>
+              <a:t>and</a:t>
+            </a:r>
+            <a:r>
+              <a:rPr sz="600" spc="-15" dirty="0">
+                <a:solidFill>
+                  <a:srgbClr val="F2E4AC"/>
+                </a:solidFill>
+                <a:latin typeface="LM Sans 8"/>
+                <a:cs typeface="LM Sans 8"/>
+                <a:hlinkClick r:id="rId2" action="ppaction://hlinksldjump"/>
+              </a:rPr>
+              <a:t> </a:t>
+            </a:r>
+            <a:r>
+              <a:rPr sz="600" spc="-10" dirty="0">
+                <a:solidFill>
+                  <a:srgbClr val="F2E4AC"/>
+                </a:solidFill>
+                <a:latin typeface="LM Sans 8"/>
+                <a:cs typeface="LM Sans 8"/>
+                <a:hlinkClick r:id="rId2" action="ppaction://hlinksldjump"/>
+              </a:rPr>
+              <a:t>Inference</a:t>
+            </a:r>
+            <a:endParaRPr sz="600">
+              <a:latin typeface="LM Sans 8"/>
+              <a:cs typeface="LM Sans 8"/>
+            </a:endParaRPr>
+          </a:p>
+        </p:txBody>
+      </p:sp>
+      <p:grpSp>
+        <p:nvGrpSpPr>
+          <p:cNvPr id="3" name="object 3"/>
+          <p:cNvGrpSpPr/>
+          <p:nvPr/>
+        </p:nvGrpSpPr>
+        <p:grpSpPr>
+          <a:xfrm>
+            <a:off x="1996427" y="140134"/>
+            <a:ext cx="444500" cy="41275"/>
+            <a:chOff x="1996427" y="140134"/>
+            <a:chExt cx="444500" cy="41275"/>
+          </a:xfrm>
+        </p:grpSpPr>
+        <p:sp>
+          <p:nvSpPr>
+            <p:cNvPr id="4" name="object 4"/>
+            <p:cNvSpPr/>
+            <p:nvPr/>
+          </p:nvSpPr>
+          <p:spPr>
+            <a:xfrm>
+              <a:off x="1998967" y="142674"/>
+              <a:ext cx="36195" cy="36195"/>
+            </a:xfrm>
+            <a:custGeom>
+              <a:avLst/>
+              <a:gdLst/>
+              <a:ahLst/>
+              <a:cxnLst/>
+              <a:rect l="l" t="t" r="r" b="b"/>
+              <a:pathLst>
+                <a:path w="36194" h="36194">
+                  <a:moveTo>
+                    <a:pt x="36002" y="18001"/>
+                  </a:moveTo>
+                  <a:lnTo>
+                    <a:pt x="34587" y="10994"/>
+                  </a:lnTo>
+                  <a:lnTo>
+                    <a:pt x="30729" y="5272"/>
+                  </a:lnTo>
+                  <a:lnTo>
+                    <a:pt x="25007" y="1414"/>
+                  </a:lnTo>
+                  <a:lnTo>
+                    <a:pt x="18000" y="0"/>
+                  </a:lnTo>
+                  <a:lnTo>
+                    <a:pt x="10994" y="1414"/>
+                  </a:lnTo>
+                  <a:lnTo>
+                    <a:pt x="5272" y="5272"/>
+                  </a:lnTo>
+                  <a:lnTo>
+                    <a:pt x="1414" y="10994"/>
+                  </a:lnTo>
+                  <a:lnTo>
+                    <a:pt x="0" y="18001"/>
+                  </a:lnTo>
+                  <a:lnTo>
+                    <a:pt x="1414" y="25008"/>
+                  </a:lnTo>
+                  <a:lnTo>
+                    <a:pt x="5272" y="30729"/>
+                  </a:lnTo>
+                  <a:lnTo>
+                    <a:pt x="10994" y="34587"/>
+                  </a:lnTo>
+                  <a:lnTo>
+                    <a:pt x="18000" y="36002"/>
+                  </a:lnTo>
+                  <a:lnTo>
+                    <a:pt x="25007" y="34587"/>
+                  </a:lnTo>
+                  <a:lnTo>
+                    <a:pt x="30729" y="30729"/>
+                  </a:lnTo>
+                  <a:lnTo>
+                    <a:pt x="34587" y="25008"/>
+                  </a:lnTo>
+                  <a:lnTo>
+                    <a:pt x="36002" y="18001"/>
+                  </a:lnTo>
+                  <a:close/>
+                </a:path>
+              </a:pathLst>
+            </a:custGeom>
+            <a:ln w="5060">
+              <a:solidFill>
+                <a:srgbClr val="F2E4AC"/>
+              </a:solidFill>
+            </a:ln>
+          </p:spPr>
+          <p:txBody>
+            <a:bodyPr wrap="square" lIns="0" tIns="0" rIns="0" bIns="0" rtlCol="0"/>
+            <a:lstStyle/>
+            <a:p>
+              <a:endParaRPr/>
+            </a:p>
+          </p:txBody>
+        </p:sp>
+        <p:sp>
+          <p:nvSpPr>
+            <p:cNvPr id="5" name="object 5"/>
+            <p:cNvSpPr/>
+            <p:nvPr/>
+          </p:nvSpPr>
+          <p:spPr>
+            <a:xfrm>
+              <a:off x="2049360" y="142674"/>
+              <a:ext cx="36195" cy="36195"/>
+            </a:xfrm>
+            <a:custGeom>
+              <a:avLst/>
+              <a:gdLst/>
+              <a:ahLst/>
+              <a:cxnLst/>
+              <a:rect l="l" t="t" r="r" b="b"/>
+              <a:pathLst>
+                <a:path w="36194" h="36194">
+                  <a:moveTo>
+                    <a:pt x="36002" y="18001"/>
+                  </a:moveTo>
+                  <a:lnTo>
+                    <a:pt x="34587" y="10994"/>
+                  </a:lnTo>
+                  <a:lnTo>
+                    <a:pt x="30729" y="5272"/>
+                  </a:lnTo>
+                  <a:lnTo>
+                    <a:pt x="25007" y="1414"/>
+                  </a:lnTo>
+                  <a:lnTo>
+                    <a:pt x="18000" y="0"/>
+                  </a:lnTo>
+                  <a:lnTo>
+                    <a:pt x="10994" y="1414"/>
+                  </a:lnTo>
+                  <a:lnTo>
+                    <a:pt x="5272" y="5272"/>
+                  </a:lnTo>
+                  <a:lnTo>
+                    <a:pt x="1414" y="10994"/>
+                  </a:lnTo>
+                  <a:lnTo>
+                    <a:pt x="0" y="18001"/>
+                  </a:lnTo>
+                  <a:lnTo>
+                    <a:pt x="1414" y="25008"/>
+                  </a:lnTo>
+                  <a:lnTo>
+                    <a:pt x="5272" y="30729"/>
+                  </a:lnTo>
+                  <a:lnTo>
+                    <a:pt x="10994" y="34587"/>
+                  </a:lnTo>
+                  <a:lnTo>
+                    <a:pt x="18000" y="36002"/>
+                  </a:lnTo>
+                  <a:lnTo>
+                    <a:pt x="25007" y="34587"/>
+                  </a:lnTo>
+                  <a:lnTo>
+                    <a:pt x="30729" y="30729"/>
+                  </a:lnTo>
+                  <a:lnTo>
+                    <a:pt x="34587" y="25008"/>
+                  </a:lnTo>
+                  <a:lnTo>
+                    <a:pt x="36002" y="18001"/>
+                  </a:lnTo>
+                  <a:close/>
+                </a:path>
+              </a:pathLst>
+            </a:custGeom>
+            <a:ln w="5060">
+              <a:solidFill>
+                <a:srgbClr val="F2E4AC"/>
+              </a:solidFill>
+            </a:ln>
+          </p:spPr>
+          <p:txBody>
+            <a:bodyPr wrap="square" lIns="0" tIns="0" rIns="0" bIns="0" rtlCol="0"/>
+            <a:lstStyle/>
+            <a:p>
+              <a:endParaRPr/>
+            </a:p>
+          </p:txBody>
+        </p:sp>
+        <p:sp>
+          <p:nvSpPr>
+            <p:cNvPr id="6" name="object 6"/>
+            <p:cNvSpPr/>
+            <p:nvPr/>
+          </p:nvSpPr>
+          <p:spPr>
+            <a:xfrm>
+              <a:off x="2099767" y="142674"/>
+              <a:ext cx="36195" cy="36195"/>
+            </a:xfrm>
+            <a:custGeom>
+              <a:avLst/>
+              <a:gdLst/>
+              <a:ahLst/>
+              <a:cxnLst/>
+              <a:rect l="l" t="t" r="r" b="b"/>
+              <a:pathLst>
+                <a:path w="36194" h="36194">
+                  <a:moveTo>
+                    <a:pt x="36002" y="18001"/>
+                  </a:moveTo>
+                  <a:lnTo>
+                    <a:pt x="34587" y="10994"/>
+                  </a:lnTo>
+                  <a:lnTo>
+                    <a:pt x="30729" y="5272"/>
+                  </a:lnTo>
+                  <a:lnTo>
+                    <a:pt x="25007" y="1414"/>
+                  </a:lnTo>
+                  <a:lnTo>
+                    <a:pt x="18000" y="0"/>
+                  </a:lnTo>
+                  <a:lnTo>
+                    <a:pt x="10994" y="1414"/>
+                  </a:lnTo>
+                  <a:lnTo>
+                    <a:pt x="5272" y="5272"/>
+                  </a:lnTo>
+                  <a:lnTo>
+                    <a:pt x="1414" y="10994"/>
+                  </a:lnTo>
+                  <a:lnTo>
+                    <a:pt x="0" y="18001"/>
+                  </a:lnTo>
+                  <a:lnTo>
+                    <a:pt x="1414" y="25008"/>
+                  </a:lnTo>
+                  <a:lnTo>
+                    <a:pt x="5272" y="30729"/>
+                  </a:lnTo>
+                  <a:lnTo>
+                    <a:pt x="10994" y="34587"/>
+                  </a:lnTo>
+                  <a:lnTo>
+                    <a:pt x="18000" y="36002"/>
+                  </a:lnTo>
+                  <a:lnTo>
+                    <a:pt x="25007" y="34587"/>
+                  </a:lnTo>
+                  <a:lnTo>
+                    <a:pt x="30729" y="30729"/>
+                  </a:lnTo>
+                  <a:lnTo>
+                    <a:pt x="34587" y="25008"/>
+                  </a:lnTo>
+                  <a:lnTo>
+                    <a:pt x="36002" y="18001"/>
+                  </a:lnTo>
+                  <a:close/>
+                </a:path>
+              </a:pathLst>
+            </a:custGeom>
+            <a:ln w="5060">
+              <a:solidFill>
+                <a:srgbClr val="F2E4AC"/>
+              </a:solidFill>
+            </a:ln>
+          </p:spPr>
+          <p:txBody>
+            <a:bodyPr wrap="square" lIns="0" tIns="0" rIns="0" bIns="0" rtlCol="0"/>
+            <a:lstStyle/>
+            <a:p>
+              <a:endParaRPr/>
+            </a:p>
+          </p:txBody>
+        </p:sp>
+        <p:sp>
+          <p:nvSpPr>
+            <p:cNvPr id="7" name="object 7"/>
+            <p:cNvSpPr/>
+            <p:nvPr/>
+          </p:nvSpPr>
+          <p:spPr>
+            <a:xfrm>
+              <a:off x="2150160" y="142674"/>
+              <a:ext cx="36195" cy="36195"/>
+            </a:xfrm>
+            <a:custGeom>
+              <a:avLst/>
+              <a:gdLst/>
+              <a:ahLst/>
+              <a:cxnLst/>
+              <a:rect l="l" t="t" r="r" b="b"/>
+              <a:pathLst>
+                <a:path w="36194" h="36194">
+                  <a:moveTo>
+                    <a:pt x="36002" y="18001"/>
+                  </a:moveTo>
+                  <a:lnTo>
+                    <a:pt x="34587" y="10994"/>
+                  </a:lnTo>
+                  <a:lnTo>
+                    <a:pt x="30729" y="5272"/>
+                  </a:lnTo>
+                  <a:lnTo>
+                    <a:pt x="25007" y="1414"/>
+                  </a:lnTo>
+                  <a:lnTo>
+                    <a:pt x="18000" y="0"/>
+                  </a:lnTo>
+                  <a:lnTo>
+                    <a:pt x="10994" y="1414"/>
+                  </a:lnTo>
+                  <a:lnTo>
+                    <a:pt x="5272" y="5272"/>
+                  </a:lnTo>
+                  <a:lnTo>
+                    <a:pt x="1414" y="10994"/>
+                  </a:lnTo>
+                  <a:lnTo>
+                    <a:pt x="0" y="18001"/>
+                  </a:lnTo>
+                  <a:lnTo>
+                    <a:pt x="1414" y="25008"/>
+                  </a:lnTo>
+                  <a:lnTo>
+                    <a:pt x="5272" y="30729"/>
+                  </a:lnTo>
+                  <a:lnTo>
+                    <a:pt x="10994" y="34587"/>
+                  </a:lnTo>
+                  <a:lnTo>
+                    <a:pt x="18000" y="36002"/>
+                  </a:lnTo>
+                  <a:lnTo>
+                    <a:pt x="25007" y="34587"/>
+                  </a:lnTo>
+                  <a:lnTo>
+                    <a:pt x="30729" y="30729"/>
+                  </a:lnTo>
+                  <a:lnTo>
+                    <a:pt x="34587" y="25008"/>
+                  </a:lnTo>
+                  <a:lnTo>
+                    <a:pt x="36002" y="18001"/>
+                  </a:lnTo>
+                  <a:close/>
+                </a:path>
+              </a:pathLst>
+            </a:custGeom>
+            <a:ln w="5060">
+              <a:solidFill>
+                <a:srgbClr val="F2E4AC"/>
+              </a:solidFill>
+            </a:ln>
+          </p:spPr>
+          <p:txBody>
+            <a:bodyPr wrap="square" lIns="0" tIns="0" rIns="0" bIns="0" rtlCol="0"/>
+            <a:lstStyle/>
+            <a:p>
+              <a:endParaRPr/>
+            </a:p>
+          </p:txBody>
+        </p:sp>
+        <p:sp>
+          <p:nvSpPr>
+            <p:cNvPr id="8" name="object 8"/>
+            <p:cNvSpPr/>
+            <p:nvPr/>
+          </p:nvSpPr>
+          <p:spPr>
+            <a:xfrm>
+              <a:off x="2200567" y="142674"/>
+              <a:ext cx="36195" cy="36195"/>
+            </a:xfrm>
+            <a:custGeom>
+              <a:avLst/>
+              <a:gdLst/>
+              <a:ahLst/>
+              <a:cxnLst/>
+              <a:rect l="l" t="t" r="r" b="b"/>
+              <a:pathLst>
+                <a:path w="36194" h="36194">
+                  <a:moveTo>
+                    <a:pt x="36002" y="18001"/>
+                  </a:moveTo>
+                  <a:lnTo>
+                    <a:pt x="34587" y="10994"/>
+                  </a:lnTo>
+                  <a:lnTo>
+                    <a:pt x="30729" y="5272"/>
+                  </a:lnTo>
+                  <a:lnTo>
+                    <a:pt x="25007" y="1414"/>
+                  </a:lnTo>
+                  <a:lnTo>
+                    <a:pt x="18000" y="0"/>
+                  </a:lnTo>
+                  <a:lnTo>
+                    <a:pt x="10994" y="1414"/>
+                  </a:lnTo>
+                  <a:lnTo>
+                    <a:pt x="5272" y="5272"/>
+                  </a:lnTo>
+                  <a:lnTo>
+                    <a:pt x="1414" y="10994"/>
+                  </a:lnTo>
+                  <a:lnTo>
+                    <a:pt x="0" y="18001"/>
+                  </a:lnTo>
+                  <a:lnTo>
+                    <a:pt x="1414" y="25008"/>
+                  </a:lnTo>
+                  <a:lnTo>
+                    <a:pt x="5272" y="30729"/>
+                  </a:lnTo>
+                  <a:lnTo>
+                    <a:pt x="10994" y="34587"/>
+                  </a:lnTo>
+                  <a:lnTo>
+                    <a:pt x="18000" y="36002"/>
+                  </a:lnTo>
+                  <a:lnTo>
+                    <a:pt x="25007" y="34587"/>
+                  </a:lnTo>
+                  <a:lnTo>
+                    <a:pt x="30729" y="30729"/>
+                  </a:lnTo>
+                  <a:lnTo>
+                    <a:pt x="34587" y="25008"/>
+                  </a:lnTo>
+                  <a:lnTo>
+                    <a:pt x="36002" y="18001"/>
+                  </a:lnTo>
+                  <a:close/>
+                </a:path>
+              </a:pathLst>
+            </a:custGeom>
+            <a:ln w="5060">
+              <a:solidFill>
+                <a:srgbClr val="F2E4AC"/>
+              </a:solidFill>
+            </a:ln>
+          </p:spPr>
+          <p:txBody>
+            <a:bodyPr wrap="square" lIns="0" tIns="0" rIns="0" bIns="0" rtlCol="0"/>
+            <a:lstStyle/>
+            <a:p>
+              <a:endParaRPr/>
+            </a:p>
+          </p:txBody>
+        </p:sp>
+        <p:sp>
+          <p:nvSpPr>
+            <p:cNvPr id="9" name="object 9"/>
+            <p:cNvSpPr/>
+            <p:nvPr/>
+          </p:nvSpPr>
+          <p:spPr>
+            <a:xfrm>
+              <a:off x="2250960" y="142674"/>
+              <a:ext cx="36195" cy="36195"/>
+            </a:xfrm>
+            <a:custGeom>
+              <a:avLst/>
+              <a:gdLst/>
+              <a:ahLst/>
+              <a:cxnLst/>
+              <a:rect l="l" t="t" r="r" b="b"/>
+              <a:pathLst>
+                <a:path w="36194" h="36194">
+                  <a:moveTo>
+                    <a:pt x="36002" y="18001"/>
+                  </a:moveTo>
+                  <a:lnTo>
+                    <a:pt x="34587" y="10994"/>
+                  </a:lnTo>
+                  <a:lnTo>
+                    <a:pt x="30729" y="5272"/>
+                  </a:lnTo>
+                  <a:lnTo>
+                    <a:pt x="25007" y="1414"/>
+                  </a:lnTo>
+                  <a:lnTo>
+                    <a:pt x="18000" y="0"/>
+                  </a:lnTo>
+                  <a:lnTo>
+                    <a:pt x="10994" y="1414"/>
+                  </a:lnTo>
+                  <a:lnTo>
+                    <a:pt x="5272" y="5272"/>
+                  </a:lnTo>
+                  <a:lnTo>
+                    <a:pt x="1414" y="10994"/>
+                  </a:lnTo>
+                  <a:lnTo>
+                    <a:pt x="0" y="18001"/>
+                  </a:lnTo>
+                  <a:lnTo>
+                    <a:pt x="1414" y="25008"/>
+                  </a:lnTo>
+                  <a:lnTo>
+                    <a:pt x="5272" y="30729"/>
+                  </a:lnTo>
+                  <a:lnTo>
+                    <a:pt x="10994" y="34587"/>
+                  </a:lnTo>
+                  <a:lnTo>
+                    <a:pt x="18000" y="36002"/>
+                  </a:lnTo>
+                  <a:lnTo>
+                    <a:pt x="25007" y="34587"/>
+                  </a:lnTo>
+                  <a:lnTo>
+                    <a:pt x="30729" y="30729"/>
+                  </a:lnTo>
+                  <a:lnTo>
+                    <a:pt x="34587" y="25008"/>
+                  </a:lnTo>
+                  <a:lnTo>
+                    <a:pt x="36002" y="18001"/>
+                  </a:lnTo>
+                  <a:close/>
+                </a:path>
+              </a:pathLst>
+            </a:custGeom>
+            <a:ln w="5060">
+              <a:solidFill>
+                <a:srgbClr val="F2E4AC"/>
+              </a:solidFill>
+            </a:ln>
+          </p:spPr>
+          <p:txBody>
+            <a:bodyPr wrap="square" lIns="0" tIns="0" rIns="0" bIns="0" rtlCol="0"/>
+            <a:lstStyle/>
+            <a:p>
+              <a:endParaRPr/>
+            </a:p>
+          </p:txBody>
+        </p:sp>
+        <p:sp>
+          <p:nvSpPr>
+            <p:cNvPr id="10" name="object 10"/>
+            <p:cNvSpPr/>
+            <p:nvPr/>
+          </p:nvSpPr>
+          <p:spPr>
+            <a:xfrm>
+              <a:off x="2301367" y="142674"/>
+              <a:ext cx="36195" cy="36195"/>
+            </a:xfrm>
+            <a:custGeom>
+              <a:avLst/>
+              <a:gdLst/>
+              <a:ahLst/>
+              <a:cxnLst/>
+              <a:rect l="l" t="t" r="r" b="b"/>
+              <a:pathLst>
+                <a:path w="36194" h="36194">
+                  <a:moveTo>
+                    <a:pt x="36002" y="18001"/>
+                  </a:moveTo>
+                  <a:lnTo>
+                    <a:pt x="34587" y="10994"/>
+                  </a:lnTo>
+                  <a:lnTo>
+                    <a:pt x="30729" y="5272"/>
+                  </a:lnTo>
+                  <a:lnTo>
+                    <a:pt x="25007" y="1414"/>
+                  </a:lnTo>
+                  <a:lnTo>
+                    <a:pt x="18000" y="0"/>
+                  </a:lnTo>
+                  <a:lnTo>
+                    <a:pt x="10994" y="1414"/>
+                  </a:lnTo>
+                  <a:lnTo>
+                    <a:pt x="5272" y="5272"/>
+                  </a:lnTo>
+                  <a:lnTo>
+                    <a:pt x="1414" y="10994"/>
+                  </a:lnTo>
+                  <a:lnTo>
+                    <a:pt x="0" y="18001"/>
+                  </a:lnTo>
+                  <a:lnTo>
+                    <a:pt x="1414" y="25008"/>
+                  </a:lnTo>
+                  <a:lnTo>
+                    <a:pt x="5272" y="30729"/>
+                  </a:lnTo>
+                  <a:lnTo>
+                    <a:pt x="10994" y="34587"/>
+                  </a:lnTo>
+                  <a:lnTo>
+                    <a:pt x="18000" y="36002"/>
+                  </a:lnTo>
+                  <a:lnTo>
+                    <a:pt x="25007" y="34587"/>
+                  </a:lnTo>
+                  <a:lnTo>
+                    <a:pt x="30729" y="30729"/>
+                  </a:lnTo>
+                  <a:lnTo>
+                    <a:pt x="34587" y="25008"/>
+                  </a:lnTo>
+                  <a:lnTo>
+                    <a:pt x="36002" y="18001"/>
+                  </a:lnTo>
+                  <a:close/>
+                </a:path>
+              </a:pathLst>
+            </a:custGeom>
+            <a:ln w="5060">
+              <a:solidFill>
+                <a:srgbClr val="F2E4AC"/>
+              </a:solidFill>
+            </a:ln>
+          </p:spPr>
+          <p:txBody>
+            <a:bodyPr wrap="square" lIns="0" tIns="0" rIns="0" bIns="0" rtlCol="0"/>
+            <a:lstStyle/>
+            <a:p>
+              <a:endParaRPr/>
+            </a:p>
+          </p:txBody>
+        </p:sp>
+        <p:sp>
+          <p:nvSpPr>
+            <p:cNvPr id="11" name="object 11"/>
+            <p:cNvSpPr/>
+            <p:nvPr/>
+          </p:nvSpPr>
+          <p:spPr>
+            <a:xfrm>
+              <a:off x="2351760" y="142674"/>
+              <a:ext cx="36195" cy="36195"/>
+            </a:xfrm>
+            <a:custGeom>
+              <a:avLst/>
+              <a:gdLst/>
+              <a:ahLst/>
+              <a:cxnLst/>
+              <a:rect l="l" t="t" r="r" b="b"/>
+              <a:pathLst>
+                <a:path w="36194" h="36194">
+                  <a:moveTo>
+                    <a:pt x="36002" y="18001"/>
+                  </a:moveTo>
+                  <a:lnTo>
+                    <a:pt x="34587" y="10994"/>
+                  </a:lnTo>
+                  <a:lnTo>
+                    <a:pt x="30729" y="5272"/>
+                  </a:lnTo>
+                  <a:lnTo>
+                    <a:pt x="25007" y="1414"/>
+                  </a:lnTo>
+                  <a:lnTo>
+                    <a:pt x="18000" y="0"/>
+                  </a:lnTo>
+                  <a:lnTo>
+                    <a:pt x="10994" y="1414"/>
+                  </a:lnTo>
+                  <a:lnTo>
+                    <a:pt x="5272" y="5272"/>
+                  </a:lnTo>
+                  <a:lnTo>
+                    <a:pt x="1414" y="10994"/>
+                  </a:lnTo>
+                  <a:lnTo>
+                    <a:pt x="0" y="18001"/>
+                  </a:lnTo>
+                  <a:lnTo>
+                    <a:pt x="1414" y="25008"/>
+                  </a:lnTo>
+                  <a:lnTo>
+                    <a:pt x="5272" y="30729"/>
+                  </a:lnTo>
+                  <a:lnTo>
+                    <a:pt x="10994" y="34587"/>
+                  </a:lnTo>
+                  <a:lnTo>
+                    <a:pt x="18000" y="36002"/>
+                  </a:lnTo>
+                  <a:lnTo>
+                    <a:pt x="25007" y="34587"/>
+                  </a:lnTo>
+                  <a:lnTo>
+                    <a:pt x="30729" y="30729"/>
+                  </a:lnTo>
+                  <a:lnTo>
+                    <a:pt x="34587" y="25008"/>
+                  </a:lnTo>
+                  <a:lnTo>
+                    <a:pt x="36002" y="18001"/>
+                  </a:lnTo>
+                  <a:close/>
+                </a:path>
+              </a:pathLst>
+            </a:custGeom>
+            <a:ln w="5060">
+              <a:solidFill>
+                <a:srgbClr val="F2E4AC"/>
+              </a:solidFill>
+            </a:ln>
+          </p:spPr>
+          <p:txBody>
+            <a:bodyPr wrap="square" lIns="0" tIns="0" rIns="0" bIns="0" rtlCol="0"/>
+            <a:lstStyle/>
+            <a:p>
+              <a:endParaRPr/>
+            </a:p>
+          </p:txBody>
+        </p:sp>
+        <p:sp>
+          <p:nvSpPr>
+            <p:cNvPr id="12" name="object 12"/>
+            <p:cNvSpPr/>
+            <p:nvPr/>
+          </p:nvSpPr>
+          <p:spPr>
+            <a:xfrm>
+              <a:off x="2402166" y="142674"/>
+              <a:ext cx="36195" cy="36195"/>
+            </a:xfrm>
+            <a:custGeom>
+              <a:avLst/>
+              <a:gdLst/>
+              <a:ahLst/>
+              <a:cxnLst/>
+              <a:rect l="l" t="t" r="r" b="b"/>
+              <a:pathLst>
+                <a:path w="36194" h="36194">
+                  <a:moveTo>
+                    <a:pt x="36002" y="18001"/>
+                  </a:moveTo>
+                  <a:lnTo>
+                    <a:pt x="34587" y="10994"/>
+                  </a:lnTo>
+                  <a:lnTo>
+                    <a:pt x="30729" y="5272"/>
+                  </a:lnTo>
+                  <a:lnTo>
+                    <a:pt x="25007" y="1414"/>
+                  </a:lnTo>
+                  <a:lnTo>
+                    <a:pt x="18000" y="0"/>
+                  </a:lnTo>
+                  <a:lnTo>
+                    <a:pt x="10994" y="1414"/>
+                  </a:lnTo>
+                  <a:lnTo>
+                    <a:pt x="5272" y="5272"/>
+                  </a:lnTo>
+                  <a:lnTo>
+                    <a:pt x="1414" y="10994"/>
+                  </a:lnTo>
+                  <a:lnTo>
+                    <a:pt x="0" y="18001"/>
+                  </a:lnTo>
+                  <a:lnTo>
+                    <a:pt x="1414" y="25008"/>
+                  </a:lnTo>
+                  <a:lnTo>
+                    <a:pt x="5272" y="30729"/>
+                  </a:lnTo>
+                  <a:lnTo>
+                    <a:pt x="10994" y="34587"/>
+                  </a:lnTo>
+                  <a:lnTo>
+                    <a:pt x="18000" y="36002"/>
+                  </a:lnTo>
+                  <a:lnTo>
+                    <a:pt x="25007" y="34587"/>
+                  </a:lnTo>
+                  <a:lnTo>
+                    <a:pt x="30729" y="30729"/>
+                  </a:lnTo>
+                  <a:lnTo>
+                    <a:pt x="34587" y="25008"/>
+                  </a:lnTo>
+                  <a:lnTo>
+                    <a:pt x="36002" y="18001"/>
+                  </a:lnTo>
+                  <a:close/>
+                </a:path>
+              </a:pathLst>
+            </a:custGeom>
+            <a:ln w="5060">
+              <a:solidFill>
+                <a:srgbClr val="F2E4AC"/>
+              </a:solidFill>
+            </a:ln>
+          </p:spPr>
+          <p:txBody>
+            <a:bodyPr wrap="square" lIns="0" tIns="0" rIns="0" bIns="0" rtlCol="0"/>
+            <a:lstStyle/>
+            <a:p>
+              <a:endParaRPr/>
+            </a:p>
+          </p:txBody>
+        </p:sp>
+      </p:grpSp>
+      <p:sp>
+        <p:nvSpPr>
+          <p:cNvPr id="13" name="object 13"/>
+          <p:cNvSpPr txBox="1"/>
+          <p:nvPr/>
+        </p:nvSpPr>
+        <p:spPr>
+          <a:xfrm>
+            <a:off x="1973618" y="25252"/>
+            <a:ext cx="415925" cy="116839"/>
+          </a:xfrm>
+          <a:prstGeom prst="rect">
+            <a:avLst/>
+          </a:prstGeom>
+        </p:spPr>
+        <p:txBody>
+          <a:bodyPr vert="horz" wrap="square" lIns="0" tIns="12065" rIns="0" bIns="0" rtlCol="0">
+            <a:spAutoFit/>
+          </a:bodyPr>
+          <a:lstStyle/>
+          <a:p>
+            <a:pPr marL="12700">
+              <a:lnSpc>
+                <a:spcPct val="100000"/>
+              </a:lnSpc>
+              <a:spcBef>
+                <a:spcPts val="95"/>
+              </a:spcBef>
+            </a:pPr>
+            <a:r>
+              <a:rPr sz="600" spc="-10" dirty="0">
+                <a:solidFill>
+                  <a:srgbClr val="F2E4AC"/>
+                </a:solidFill>
+                <a:latin typeface="LM Sans 8"/>
+                <a:cs typeface="LM Sans 8"/>
+                <a:hlinkClick r:id="rId3" action="ppaction://hlinksldjump"/>
+              </a:rPr>
+              <a:t>Bayes’ </a:t>
+            </a:r>
+            <a:r>
+              <a:rPr sz="600" spc="-20" dirty="0">
+                <a:solidFill>
+                  <a:srgbClr val="F2E4AC"/>
+                </a:solidFill>
+                <a:latin typeface="LM Sans 8"/>
+                <a:cs typeface="LM Sans 8"/>
+                <a:hlinkClick r:id="rId3" action="ppaction://hlinksldjump"/>
+              </a:rPr>
+              <a:t>Rule</a:t>
+            </a:r>
+            <a:endParaRPr sz="600">
+              <a:latin typeface="LM Sans 8"/>
+              <a:cs typeface="LM Sans 8"/>
+            </a:endParaRPr>
+          </a:p>
+        </p:txBody>
+      </p:sp>
+      <p:grpSp>
+        <p:nvGrpSpPr>
+          <p:cNvPr id="14" name="object 14"/>
+          <p:cNvGrpSpPr/>
+          <p:nvPr/>
+        </p:nvGrpSpPr>
+        <p:grpSpPr>
+          <a:xfrm>
+            <a:off x="3450247" y="140134"/>
+            <a:ext cx="192405" cy="41275"/>
+            <a:chOff x="3450247" y="140134"/>
+            <a:chExt cx="192405" cy="41275"/>
+          </a:xfrm>
+        </p:grpSpPr>
+        <p:sp>
+          <p:nvSpPr>
+            <p:cNvPr id="15" name="object 15"/>
+            <p:cNvSpPr/>
+            <p:nvPr/>
+          </p:nvSpPr>
+          <p:spPr>
+            <a:xfrm>
+              <a:off x="3452787" y="142674"/>
+              <a:ext cx="36195" cy="36195"/>
+            </a:xfrm>
+            <a:custGeom>
+              <a:avLst/>
+              <a:gdLst/>
+              <a:ahLst/>
+              <a:cxnLst/>
+              <a:rect l="l" t="t" r="r" b="b"/>
+              <a:pathLst>
+                <a:path w="36195" h="36194">
+                  <a:moveTo>
+                    <a:pt x="36002" y="18001"/>
+                  </a:moveTo>
+                  <a:lnTo>
+                    <a:pt x="34587" y="10994"/>
+                  </a:lnTo>
+                  <a:lnTo>
+                    <a:pt x="30729" y="5272"/>
+                  </a:lnTo>
+                  <a:lnTo>
+                    <a:pt x="25007" y="1414"/>
+                  </a:lnTo>
+                  <a:lnTo>
+                    <a:pt x="18000" y="0"/>
+                  </a:lnTo>
+                  <a:lnTo>
+                    <a:pt x="10994" y="1414"/>
+                  </a:lnTo>
+                  <a:lnTo>
+                    <a:pt x="5272" y="5272"/>
+                  </a:lnTo>
+                  <a:lnTo>
+                    <a:pt x="1414" y="10994"/>
+                  </a:lnTo>
+                  <a:lnTo>
+                    <a:pt x="0" y="18001"/>
+                  </a:lnTo>
+                  <a:lnTo>
+                    <a:pt x="1414" y="25008"/>
+                  </a:lnTo>
+                  <a:lnTo>
+                    <a:pt x="5272" y="30729"/>
+                  </a:lnTo>
+                  <a:lnTo>
+                    <a:pt x="10994" y="34587"/>
+                  </a:lnTo>
+                  <a:lnTo>
+                    <a:pt x="18000" y="36002"/>
+                  </a:lnTo>
+                  <a:lnTo>
+                    <a:pt x="25007" y="34587"/>
+                  </a:lnTo>
+                  <a:lnTo>
+                    <a:pt x="30729" y="30729"/>
+                  </a:lnTo>
+                  <a:lnTo>
+                    <a:pt x="34587" y="25008"/>
+                  </a:lnTo>
+                  <a:lnTo>
+                    <a:pt x="36002" y="18001"/>
+                  </a:lnTo>
+                  <a:close/>
+                </a:path>
+              </a:pathLst>
+            </a:custGeom>
+            <a:ln w="5060">
+              <a:solidFill>
+                <a:srgbClr val="F2E4AC"/>
+              </a:solidFill>
+            </a:ln>
+          </p:spPr>
+          <p:txBody>
+            <a:bodyPr wrap="square" lIns="0" tIns="0" rIns="0" bIns="0" rtlCol="0"/>
+            <a:lstStyle/>
+            <a:p>
+              <a:endParaRPr/>
+            </a:p>
+          </p:txBody>
+        </p:sp>
+        <p:sp>
+          <p:nvSpPr>
+            <p:cNvPr id="16" name="object 16"/>
+            <p:cNvSpPr/>
+            <p:nvPr/>
+          </p:nvSpPr>
+          <p:spPr>
+            <a:xfrm>
+              <a:off x="3503180" y="142674"/>
+              <a:ext cx="36195" cy="36195"/>
+            </a:xfrm>
+            <a:custGeom>
+              <a:avLst/>
+              <a:gdLst/>
+              <a:ahLst/>
+              <a:cxnLst/>
+              <a:rect l="l" t="t" r="r" b="b"/>
+              <a:pathLst>
+                <a:path w="36195" h="36194">
+                  <a:moveTo>
+                    <a:pt x="36002" y="18001"/>
+                  </a:moveTo>
+                  <a:lnTo>
+                    <a:pt x="34587" y="10994"/>
+                  </a:lnTo>
+                  <a:lnTo>
+                    <a:pt x="30729" y="5272"/>
+                  </a:lnTo>
+                  <a:lnTo>
+                    <a:pt x="25007" y="1414"/>
+                  </a:lnTo>
+                  <a:lnTo>
+                    <a:pt x="18000" y="0"/>
+                  </a:lnTo>
+                  <a:lnTo>
+                    <a:pt x="10994" y="1414"/>
+                  </a:lnTo>
+                  <a:lnTo>
+                    <a:pt x="5272" y="5272"/>
+                  </a:lnTo>
+                  <a:lnTo>
+                    <a:pt x="1414" y="10994"/>
+                  </a:lnTo>
+                  <a:lnTo>
+                    <a:pt x="0" y="18001"/>
+                  </a:lnTo>
+                  <a:lnTo>
+                    <a:pt x="1414" y="25008"/>
+                  </a:lnTo>
+                  <a:lnTo>
+                    <a:pt x="5272" y="30729"/>
+                  </a:lnTo>
+                  <a:lnTo>
+                    <a:pt x="10994" y="34587"/>
+                  </a:lnTo>
+                  <a:lnTo>
+                    <a:pt x="18000" y="36002"/>
+                  </a:lnTo>
+                  <a:lnTo>
+                    <a:pt x="25007" y="34587"/>
+                  </a:lnTo>
+                  <a:lnTo>
+                    <a:pt x="30729" y="30729"/>
+                  </a:lnTo>
+                  <a:lnTo>
+                    <a:pt x="34587" y="25008"/>
+                  </a:lnTo>
+                  <a:lnTo>
+                    <a:pt x="36002" y="18001"/>
+                  </a:lnTo>
+                  <a:close/>
+                </a:path>
+              </a:pathLst>
+            </a:custGeom>
+            <a:ln w="5060">
+              <a:solidFill>
+                <a:srgbClr val="F2E4AC"/>
+              </a:solidFill>
+            </a:ln>
+          </p:spPr>
+          <p:txBody>
+            <a:bodyPr wrap="square" lIns="0" tIns="0" rIns="0" bIns="0" rtlCol="0"/>
+            <a:lstStyle/>
+            <a:p>
+              <a:endParaRPr/>
+            </a:p>
+          </p:txBody>
+        </p:sp>
+        <p:sp>
+          <p:nvSpPr>
+            <p:cNvPr id="17" name="object 17"/>
+            <p:cNvSpPr/>
+            <p:nvPr/>
+          </p:nvSpPr>
+          <p:spPr>
+            <a:xfrm>
+              <a:off x="3553574" y="142674"/>
+              <a:ext cx="36195" cy="36195"/>
+            </a:xfrm>
+            <a:custGeom>
+              <a:avLst/>
+              <a:gdLst/>
+              <a:ahLst/>
+              <a:cxnLst/>
+              <a:rect l="l" t="t" r="r" b="b"/>
+              <a:pathLst>
+                <a:path w="36195" h="36194">
+                  <a:moveTo>
+                    <a:pt x="36002" y="18001"/>
+                  </a:moveTo>
+                  <a:lnTo>
+                    <a:pt x="34587" y="10994"/>
+                  </a:lnTo>
+                  <a:lnTo>
+                    <a:pt x="30729" y="5272"/>
+                  </a:lnTo>
+                  <a:lnTo>
+                    <a:pt x="25007" y="1414"/>
+                  </a:lnTo>
+                  <a:lnTo>
+                    <a:pt x="18000" y="0"/>
+                  </a:lnTo>
+                  <a:lnTo>
+                    <a:pt x="10994" y="1414"/>
+                  </a:lnTo>
+                  <a:lnTo>
+                    <a:pt x="5272" y="5272"/>
+                  </a:lnTo>
+                  <a:lnTo>
+                    <a:pt x="1414" y="10994"/>
+                  </a:lnTo>
+                  <a:lnTo>
+                    <a:pt x="0" y="18001"/>
+                  </a:lnTo>
+                  <a:lnTo>
+                    <a:pt x="1414" y="25008"/>
+                  </a:lnTo>
+                  <a:lnTo>
+                    <a:pt x="5272" y="30729"/>
+                  </a:lnTo>
+                  <a:lnTo>
+                    <a:pt x="10994" y="34587"/>
+                  </a:lnTo>
+                  <a:lnTo>
+                    <a:pt x="18000" y="36002"/>
+                  </a:lnTo>
+                  <a:lnTo>
+                    <a:pt x="25007" y="34587"/>
+                  </a:lnTo>
+                  <a:lnTo>
+                    <a:pt x="30729" y="30729"/>
+                  </a:lnTo>
+                  <a:lnTo>
+                    <a:pt x="34587" y="25008"/>
+                  </a:lnTo>
+                  <a:lnTo>
+                    <a:pt x="36002" y="18001"/>
+                  </a:lnTo>
+                  <a:close/>
+                </a:path>
+              </a:pathLst>
+            </a:custGeom>
+            <a:ln w="5060">
+              <a:solidFill>
+                <a:srgbClr val="F2E4AC"/>
+              </a:solidFill>
+            </a:ln>
+          </p:spPr>
+          <p:txBody>
+            <a:bodyPr wrap="square" lIns="0" tIns="0" rIns="0" bIns="0" rtlCol="0"/>
+            <a:lstStyle/>
+            <a:p>
+              <a:endParaRPr/>
+            </a:p>
+          </p:txBody>
+        </p:sp>
+        <p:sp>
+          <p:nvSpPr>
+            <p:cNvPr id="18" name="object 18"/>
+            <p:cNvSpPr/>
+            <p:nvPr/>
+          </p:nvSpPr>
+          <p:spPr>
+            <a:xfrm>
+              <a:off x="3603980" y="142674"/>
+              <a:ext cx="36195" cy="36195"/>
+            </a:xfrm>
+            <a:custGeom>
+              <a:avLst/>
+              <a:gdLst/>
+              <a:ahLst/>
+              <a:cxnLst/>
+              <a:rect l="l" t="t" r="r" b="b"/>
+              <a:pathLst>
+                <a:path w="36195" h="36194">
+                  <a:moveTo>
+                    <a:pt x="36002" y="18001"/>
+                  </a:moveTo>
+                  <a:lnTo>
+                    <a:pt x="34587" y="10994"/>
+                  </a:lnTo>
+                  <a:lnTo>
+                    <a:pt x="30729" y="5272"/>
+                  </a:lnTo>
+                  <a:lnTo>
+                    <a:pt x="25007" y="1414"/>
+                  </a:lnTo>
+                  <a:lnTo>
+                    <a:pt x="18000" y="0"/>
+                  </a:lnTo>
+                  <a:lnTo>
+                    <a:pt x="10994" y="1414"/>
+                  </a:lnTo>
+                  <a:lnTo>
+                    <a:pt x="5272" y="5272"/>
+                  </a:lnTo>
+                  <a:lnTo>
+                    <a:pt x="1414" y="10994"/>
+                  </a:lnTo>
+                  <a:lnTo>
+                    <a:pt x="0" y="18001"/>
+                  </a:lnTo>
+                  <a:lnTo>
+                    <a:pt x="1414" y="25008"/>
+                  </a:lnTo>
+                  <a:lnTo>
+                    <a:pt x="5272" y="30729"/>
+                  </a:lnTo>
+                  <a:lnTo>
+                    <a:pt x="10994" y="34587"/>
+                  </a:lnTo>
+                  <a:lnTo>
+                    <a:pt x="18000" y="36002"/>
+                  </a:lnTo>
+                  <a:lnTo>
+                    <a:pt x="25007" y="34587"/>
+                  </a:lnTo>
+                  <a:lnTo>
+                    <a:pt x="30729" y="30729"/>
+                  </a:lnTo>
+                  <a:lnTo>
+                    <a:pt x="34587" y="25008"/>
+                  </a:lnTo>
+                  <a:lnTo>
+                    <a:pt x="36002" y="18001"/>
+                  </a:lnTo>
+                  <a:close/>
+                </a:path>
+              </a:pathLst>
+            </a:custGeom>
+            <a:ln w="5060">
+              <a:solidFill>
+                <a:srgbClr val="F2E4AC"/>
+              </a:solidFill>
+            </a:ln>
+          </p:spPr>
+          <p:txBody>
+            <a:bodyPr wrap="square" lIns="0" tIns="0" rIns="0" bIns="0" rtlCol="0"/>
+            <a:lstStyle/>
+            <a:p>
+              <a:endParaRPr/>
+            </a:p>
+          </p:txBody>
+        </p:sp>
+      </p:grpSp>
+      <p:sp>
+        <p:nvSpPr>
+          <p:cNvPr id="19" name="object 19"/>
+          <p:cNvSpPr txBox="1"/>
+          <p:nvPr/>
+        </p:nvSpPr>
+        <p:spPr>
+          <a:xfrm>
+            <a:off x="3427425" y="25252"/>
+            <a:ext cx="614680" cy="116839"/>
+          </a:xfrm>
+          <a:prstGeom prst="rect">
+            <a:avLst/>
+          </a:prstGeom>
+        </p:spPr>
+        <p:txBody>
+          <a:bodyPr vert="horz" wrap="square" lIns="0" tIns="12065" rIns="0" bIns="0" rtlCol="0">
+            <a:spAutoFit/>
+          </a:bodyPr>
+          <a:lstStyle/>
+          <a:p>
+            <a:pPr marL="12700">
+              <a:lnSpc>
+                <a:spcPct val="100000"/>
+              </a:lnSpc>
+              <a:spcBef>
+                <a:spcPts val="95"/>
+              </a:spcBef>
+            </a:pPr>
+            <a:r>
+              <a:rPr sz="600" dirty="0">
+                <a:solidFill>
+                  <a:srgbClr val="F2E4AC"/>
+                </a:solidFill>
+                <a:latin typeface="LM Sans 8"/>
+                <a:cs typeface="LM Sans 8"/>
+                <a:hlinkClick r:id="rId4" action="ppaction://hlinksldjump"/>
+              </a:rPr>
+              <a:t>Association</a:t>
+            </a:r>
+            <a:r>
+              <a:rPr sz="600" spc="-5" dirty="0">
+                <a:solidFill>
+                  <a:srgbClr val="F2E4AC"/>
+                </a:solidFill>
+                <a:latin typeface="LM Sans 8"/>
+                <a:cs typeface="LM Sans 8"/>
+                <a:hlinkClick r:id="rId4" action="ppaction://hlinksldjump"/>
+              </a:rPr>
+              <a:t> </a:t>
+            </a:r>
+            <a:r>
+              <a:rPr sz="600" spc="-10" dirty="0">
+                <a:solidFill>
+                  <a:srgbClr val="F2E4AC"/>
+                </a:solidFill>
+                <a:latin typeface="LM Sans 8"/>
+                <a:cs typeface="LM Sans 8"/>
+                <a:hlinkClick r:id="rId4" action="ppaction://hlinksldjump"/>
+              </a:rPr>
+              <a:t>Rules</a:t>
+            </a:r>
+            <a:endParaRPr sz="600">
+              <a:latin typeface="LM Sans 8"/>
+              <a:cs typeface="LM Sans 8"/>
+            </a:endParaRPr>
+          </a:p>
+        </p:txBody>
+      </p:sp>
+      <p:grpSp>
+        <p:nvGrpSpPr>
+          <p:cNvPr id="20" name="object 20"/>
+          <p:cNvGrpSpPr/>
+          <p:nvPr/>
+        </p:nvGrpSpPr>
+        <p:grpSpPr>
+          <a:xfrm>
+            <a:off x="5077320" y="140134"/>
+            <a:ext cx="142240" cy="41275"/>
+            <a:chOff x="5077320" y="140134"/>
+            <a:chExt cx="142240" cy="41275"/>
+          </a:xfrm>
+        </p:grpSpPr>
+        <p:sp>
+          <p:nvSpPr>
+            <p:cNvPr id="21" name="object 21"/>
+            <p:cNvSpPr/>
+            <p:nvPr/>
+          </p:nvSpPr>
+          <p:spPr>
+            <a:xfrm>
+              <a:off x="5079860" y="142674"/>
+              <a:ext cx="36195" cy="36195"/>
+            </a:xfrm>
+            <a:custGeom>
+              <a:avLst/>
+              <a:gdLst/>
+              <a:ahLst/>
+              <a:cxnLst/>
+              <a:rect l="l" t="t" r="r" b="b"/>
+              <a:pathLst>
+                <a:path w="36195" h="36194">
+                  <a:moveTo>
+                    <a:pt x="36002" y="18001"/>
+                  </a:moveTo>
+                  <a:lnTo>
+                    <a:pt x="34587" y="10994"/>
+                  </a:lnTo>
+                  <a:lnTo>
+                    <a:pt x="30729" y="5272"/>
+                  </a:lnTo>
+                  <a:lnTo>
+                    <a:pt x="25007" y="1414"/>
+                  </a:lnTo>
+                  <a:lnTo>
+                    <a:pt x="18000" y="0"/>
+                  </a:lnTo>
+                  <a:lnTo>
+                    <a:pt x="10994" y="1414"/>
+                  </a:lnTo>
+                  <a:lnTo>
+                    <a:pt x="5272" y="5272"/>
+                  </a:lnTo>
+                  <a:lnTo>
+                    <a:pt x="1414" y="10994"/>
+                  </a:lnTo>
+                  <a:lnTo>
+                    <a:pt x="0" y="18001"/>
+                  </a:lnTo>
+                  <a:lnTo>
+                    <a:pt x="1414" y="25008"/>
+                  </a:lnTo>
+                  <a:lnTo>
+                    <a:pt x="5272" y="30729"/>
+                  </a:lnTo>
+                  <a:lnTo>
+                    <a:pt x="10994" y="34587"/>
+                  </a:lnTo>
+                  <a:lnTo>
+                    <a:pt x="18000" y="36002"/>
+                  </a:lnTo>
+                  <a:lnTo>
+                    <a:pt x="25007" y="34587"/>
+                  </a:lnTo>
+                  <a:lnTo>
+                    <a:pt x="30729" y="30729"/>
+                  </a:lnTo>
+                  <a:lnTo>
+                    <a:pt x="34587" y="25008"/>
+                  </a:lnTo>
+                  <a:lnTo>
+                    <a:pt x="36002" y="18001"/>
+                  </a:lnTo>
+                  <a:close/>
+                </a:path>
+              </a:pathLst>
+            </a:custGeom>
+            <a:ln w="5060">
+              <a:solidFill>
+                <a:srgbClr val="FFFFFF"/>
+              </a:solidFill>
+            </a:ln>
+          </p:spPr>
+          <p:txBody>
+            <a:bodyPr wrap="square" lIns="0" tIns="0" rIns="0" bIns="0" rtlCol="0"/>
+            <a:lstStyle/>
+            <a:p>
+              <a:endParaRPr/>
+            </a:p>
+          </p:txBody>
+        </p:sp>
+        <p:sp>
+          <p:nvSpPr>
+            <p:cNvPr id="22" name="object 22"/>
+            <p:cNvSpPr/>
+            <p:nvPr/>
+          </p:nvSpPr>
+          <p:spPr>
+            <a:xfrm>
+              <a:off x="5130253" y="142674"/>
+              <a:ext cx="36195" cy="36195"/>
+            </a:xfrm>
+            <a:custGeom>
+              <a:avLst/>
+              <a:gdLst/>
+              <a:ahLst/>
+              <a:cxnLst/>
+              <a:rect l="l" t="t" r="r" b="b"/>
+              <a:pathLst>
+                <a:path w="36195" h="36194">
+                  <a:moveTo>
+                    <a:pt x="18000" y="0"/>
+                  </a:moveTo>
+                  <a:lnTo>
+                    <a:pt x="10994" y="1414"/>
+                  </a:lnTo>
+                  <a:lnTo>
+                    <a:pt x="5272" y="5272"/>
+                  </a:lnTo>
+                  <a:lnTo>
+                    <a:pt x="1414" y="10994"/>
+                  </a:lnTo>
+                  <a:lnTo>
+                    <a:pt x="0" y="18001"/>
+                  </a:lnTo>
+                  <a:lnTo>
+                    <a:pt x="1414" y="25008"/>
+                  </a:lnTo>
+                  <a:lnTo>
+                    <a:pt x="5272" y="30729"/>
+                  </a:lnTo>
+                  <a:lnTo>
+                    <a:pt x="10994" y="34587"/>
+                  </a:lnTo>
+                  <a:lnTo>
+                    <a:pt x="18000" y="36002"/>
+                  </a:lnTo>
+                  <a:lnTo>
+                    <a:pt x="25007" y="34587"/>
+                  </a:lnTo>
+                  <a:lnTo>
+                    <a:pt x="30729" y="30729"/>
+                  </a:lnTo>
+                  <a:lnTo>
+                    <a:pt x="34587" y="25008"/>
+                  </a:lnTo>
+                  <a:lnTo>
+                    <a:pt x="36002" y="18001"/>
+                  </a:lnTo>
+                  <a:lnTo>
+                    <a:pt x="34587" y="10994"/>
+                  </a:lnTo>
+                  <a:lnTo>
+                    <a:pt x="30729" y="5272"/>
+                  </a:lnTo>
+                  <a:lnTo>
+                    <a:pt x="25007" y="1414"/>
+                  </a:lnTo>
+                  <a:lnTo>
+                    <a:pt x="18000" y="0"/>
+                  </a:lnTo>
+                  <a:close/>
+                </a:path>
+              </a:pathLst>
+            </a:custGeom>
+            <a:solidFill>
+              <a:srgbClr val="FFFFFF"/>
+            </a:solidFill>
+          </p:spPr>
+          <p:txBody>
+            <a:bodyPr wrap="square" lIns="0" tIns="0" rIns="0" bIns="0" rtlCol="0"/>
+            <a:lstStyle/>
+            <a:p>
+              <a:endParaRPr/>
+            </a:p>
+          </p:txBody>
+        </p:sp>
+        <p:sp>
+          <p:nvSpPr>
+            <p:cNvPr id="23" name="object 23"/>
+            <p:cNvSpPr/>
+            <p:nvPr/>
+          </p:nvSpPr>
+          <p:spPr>
+            <a:xfrm>
+              <a:off x="5130253" y="142674"/>
+              <a:ext cx="36195" cy="36195"/>
+            </a:xfrm>
+            <a:custGeom>
+              <a:avLst/>
+              <a:gdLst/>
+              <a:ahLst/>
+              <a:cxnLst/>
+              <a:rect l="l" t="t" r="r" b="b"/>
+              <a:pathLst>
+                <a:path w="36195" h="36194">
+                  <a:moveTo>
+                    <a:pt x="36002" y="18001"/>
+                  </a:moveTo>
+                  <a:lnTo>
+                    <a:pt x="34587" y="10994"/>
+                  </a:lnTo>
+                  <a:lnTo>
+                    <a:pt x="30729" y="5272"/>
+                  </a:lnTo>
+                  <a:lnTo>
+                    <a:pt x="25007" y="1414"/>
+                  </a:lnTo>
+                  <a:lnTo>
+                    <a:pt x="18000" y="0"/>
+                  </a:lnTo>
+                  <a:lnTo>
+                    <a:pt x="10994" y="1414"/>
+                  </a:lnTo>
+                  <a:lnTo>
+                    <a:pt x="5272" y="5272"/>
+                  </a:lnTo>
+                  <a:lnTo>
+                    <a:pt x="1414" y="10994"/>
+                  </a:lnTo>
+                  <a:lnTo>
+                    <a:pt x="0" y="18001"/>
+                  </a:lnTo>
+                  <a:lnTo>
+                    <a:pt x="1414" y="25008"/>
+                  </a:lnTo>
+                  <a:lnTo>
+                    <a:pt x="5272" y="30729"/>
+                  </a:lnTo>
+                  <a:lnTo>
+                    <a:pt x="10994" y="34587"/>
+                  </a:lnTo>
+                  <a:lnTo>
+                    <a:pt x="18000" y="36002"/>
+                  </a:lnTo>
+                  <a:lnTo>
+                    <a:pt x="25007" y="34587"/>
+                  </a:lnTo>
+                  <a:lnTo>
+                    <a:pt x="30729" y="30729"/>
+                  </a:lnTo>
+                  <a:lnTo>
+                    <a:pt x="34587" y="25008"/>
+                  </a:lnTo>
+                  <a:lnTo>
+                    <a:pt x="36002" y="18001"/>
+                  </a:lnTo>
+                  <a:close/>
+                </a:path>
+              </a:pathLst>
+            </a:custGeom>
+            <a:ln w="5060">
+              <a:solidFill>
+                <a:srgbClr val="FFFFFF"/>
+              </a:solidFill>
+            </a:ln>
+          </p:spPr>
+          <p:txBody>
+            <a:bodyPr wrap="square" lIns="0" tIns="0" rIns="0" bIns="0" rtlCol="0"/>
+            <a:lstStyle/>
+            <a:p>
+              <a:endParaRPr/>
+            </a:p>
+          </p:txBody>
+        </p:sp>
+        <p:sp>
+          <p:nvSpPr>
+            <p:cNvPr id="24" name="object 24"/>
+            <p:cNvSpPr/>
+            <p:nvPr/>
+          </p:nvSpPr>
+          <p:spPr>
+            <a:xfrm>
+              <a:off x="5180660" y="142674"/>
+              <a:ext cx="36195" cy="36195"/>
+            </a:xfrm>
+            <a:custGeom>
+              <a:avLst/>
+              <a:gdLst/>
+              <a:ahLst/>
+              <a:cxnLst/>
+              <a:rect l="l" t="t" r="r" b="b"/>
+              <a:pathLst>
+                <a:path w="36195" h="36194">
+                  <a:moveTo>
+                    <a:pt x="36002" y="18001"/>
+                  </a:moveTo>
+                  <a:lnTo>
+                    <a:pt x="34587" y="10994"/>
+                  </a:lnTo>
+                  <a:lnTo>
+                    <a:pt x="30729" y="5272"/>
+                  </a:lnTo>
+                  <a:lnTo>
+                    <a:pt x="25007" y="1414"/>
+                  </a:lnTo>
+                  <a:lnTo>
+                    <a:pt x="18000" y="0"/>
+                  </a:lnTo>
+                  <a:lnTo>
+                    <a:pt x="10994" y="1414"/>
+                  </a:lnTo>
+                  <a:lnTo>
+                    <a:pt x="5272" y="5272"/>
+                  </a:lnTo>
+                  <a:lnTo>
+                    <a:pt x="1414" y="10994"/>
+                  </a:lnTo>
+                  <a:lnTo>
+                    <a:pt x="0" y="18001"/>
+                  </a:lnTo>
+                  <a:lnTo>
+                    <a:pt x="1414" y="25008"/>
+                  </a:lnTo>
+                  <a:lnTo>
+                    <a:pt x="5272" y="30729"/>
+                  </a:lnTo>
+                  <a:lnTo>
+                    <a:pt x="10994" y="34587"/>
+                  </a:lnTo>
+                  <a:lnTo>
+                    <a:pt x="18000" y="36002"/>
+                  </a:lnTo>
+                  <a:lnTo>
+                    <a:pt x="25007" y="34587"/>
+                  </a:lnTo>
+                  <a:lnTo>
+                    <a:pt x="30729" y="30729"/>
+                  </a:lnTo>
+                  <a:lnTo>
+                    <a:pt x="34587" y="25008"/>
+                  </a:lnTo>
+                  <a:lnTo>
+                    <a:pt x="36002" y="18001"/>
+                  </a:lnTo>
+                  <a:close/>
+                </a:path>
+              </a:pathLst>
+            </a:custGeom>
+            <a:ln w="5060">
+              <a:solidFill>
+                <a:srgbClr val="FFFFFF"/>
+              </a:solidFill>
+            </a:ln>
+          </p:spPr>
+          <p:txBody>
+            <a:bodyPr wrap="square" lIns="0" tIns="0" rIns="0" bIns="0" rtlCol="0"/>
+            <a:lstStyle/>
+            <a:p>
+              <a:endParaRPr/>
+            </a:p>
+          </p:txBody>
+        </p:sp>
+      </p:grpSp>
+      <p:sp>
+        <p:nvSpPr>
+          <p:cNvPr id="25" name="object 25"/>
+          <p:cNvSpPr txBox="1"/>
+          <p:nvPr/>
+        </p:nvSpPr>
+        <p:spPr>
+          <a:xfrm>
+            <a:off x="5054511" y="25252"/>
+            <a:ext cx="610235" cy="116839"/>
+          </a:xfrm>
+          <a:prstGeom prst="rect">
+            <a:avLst/>
+          </a:prstGeom>
+        </p:spPr>
+        <p:txBody>
+          <a:bodyPr vert="horz" wrap="square" lIns="0" tIns="12065" rIns="0" bIns="0" rtlCol="0">
+            <a:spAutoFit/>
+          </a:bodyPr>
+          <a:lstStyle/>
+          <a:p>
+            <a:pPr marL="12700">
+              <a:lnSpc>
+                <a:spcPct val="100000"/>
+              </a:lnSpc>
+              <a:spcBef>
+                <a:spcPts val="95"/>
+              </a:spcBef>
+            </a:pPr>
+            <a:r>
+              <a:rPr sz="600" dirty="0">
+                <a:solidFill>
+                  <a:srgbClr val="FFFFFF"/>
+                </a:solidFill>
+                <a:latin typeface="LM Sans 8"/>
+                <a:cs typeface="LM Sans 8"/>
+                <a:hlinkClick r:id="rId5" action="ppaction://hlinksldjump"/>
+              </a:rPr>
+              <a:t>Apriori</a:t>
+            </a:r>
+            <a:r>
+              <a:rPr sz="600" spc="-35" dirty="0">
+                <a:solidFill>
+                  <a:srgbClr val="FFFFFF"/>
+                </a:solidFill>
+                <a:latin typeface="LM Sans 8"/>
+                <a:cs typeface="LM Sans 8"/>
+                <a:hlinkClick r:id="rId5" action="ppaction://hlinksldjump"/>
+              </a:rPr>
+              <a:t> </a:t>
+            </a:r>
+            <a:r>
+              <a:rPr sz="600" spc="-10" dirty="0">
+                <a:solidFill>
+                  <a:srgbClr val="FFFFFF"/>
+                </a:solidFill>
+                <a:latin typeface="LM Sans 8"/>
+                <a:cs typeface="LM Sans 8"/>
+                <a:hlinkClick r:id="rId5" action="ppaction://hlinksldjump"/>
+              </a:rPr>
+              <a:t>Algorithm</a:t>
+            </a:r>
+            <a:endParaRPr sz="600">
+              <a:latin typeface="LM Sans 8"/>
+              <a:cs typeface="LM Sans 8"/>
+            </a:endParaRPr>
+          </a:p>
+        </p:txBody>
+      </p:sp>
+      <p:sp>
+        <p:nvSpPr>
+          <p:cNvPr id="26" name="object 26"/>
+          <p:cNvSpPr/>
+          <p:nvPr/>
+        </p:nvSpPr>
+        <p:spPr>
+          <a:xfrm>
+            <a:off x="0" y="203987"/>
+            <a:ext cx="5760085" cy="340360"/>
+          </a:xfrm>
+          <a:custGeom>
+            <a:avLst/>
+            <a:gdLst/>
+            <a:ahLst/>
+            <a:cxnLst/>
+            <a:rect l="l" t="t" r="r" b="b"/>
+            <a:pathLst>
+              <a:path w="5760085" h="340359">
+                <a:moveTo>
+                  <a:pt x="5759996" y="0"/>
+                </a:moveTo>
+                <a:lnTo>
+                  <a:pt x="0" y="0"/>
+                </a:lnTo>
+                <a:lnTo>
+                  <a:pt x="0" y="339991"/>
+                </a:lnTo>
+                <a:lnTo>
+                  <a:pt x="5759996" y="339991"/>
+                </a:lnTo>
+                <a:lnTo>
+                  <a:pt x="5759996" y="0"/>
+                </a:lnTo>
+                <a:close/>
+              </a:path>
+            </a:pathLst>
+          </a:custGeom>
+          <a:solidFill>
+            <a:srgbClr val="C1E5B1"/>
+          </a:solidFill>
+        </p:spPr>
+        <p:txBody>
+          <a:bodyPr wrap="square" lIns="0" tIns="0" rIns="0" bIns="0" rtlCol="0"/>
+          <a:lstStyle/>
+          <a:p>
+            <a:endParaRPr/>
+          </a:p>
+        </p:txBody>
+      </p:sp>
+      <p:sp>
+        <p:nvSpPr>
+          <p:cNvPr id="27" name="object 27"/>
+          <p:cNvSpPr txBox="1"/>
+          <p:nvPr/>
+        </p:nvSpPr>
+        <p:spPr>
+          <a:xfrm>
+            <a:off x="95300" y="280299"/>
+            <a:ext cx="2819400" cy="207645"/>
+          </a:xfrm>
+          <a:prstGeom prst="rect">
+            <a:avLst/>
+          </a:prstGeom>
+        </p:spPr>
+        <p:txBody>
+          <a:bodyPr vert="horz" wrap="square" lIns="0" tIns="12065" rIns="0" bIns="0" rtlCol="0">
+            <a:spAutoFit/>
+          </a:bodyPr>
+          <a:lstStyle/>
+          <a:p>
+            <a:pPr marL="12700">
+              <a:lnSpc>
+                <a:spcPct val="100000"/>
+              </a:lnSpc>
+              <a:spcBef>
+                <a:spcPts val="95"/>
+              </a:spcBef>
+            </a:pPr>
+            <a:r>
+              <a:rPr sz="1200" b="1" spc="-10" dirty="0">
+                <a:solidFill>
+                  <a:srgbClr val="0168B4"/>
+                </a:solidFill>
+                <a:latin typeface="LM Sans 10"/>
+                <a:cs typeface="LM Sans 10"/>
+              </a:rPr>
+              <a:t>Apriori</a:t>
+            </a:r>
+            <a:r>
+              <a:rPr sz="1200" b="1" spc="-55" dirty="0">
+                <a:solidFill>
+                  <a:srgbClr val="0168B4"/>
+                </a:solidFill>
+                <a:latin typeface="LM Sans 10"/>
+                <a:cs typeface="LM Sans 10"/>
+              </a:rPr>
+              <a:t> </a:t>
+            </a:r>
+            <a:r>
+              <a:rPr sz="1200" b="1" dirty="0">
+                <a:solidFill>
+                  <a:srgbClr val="0168B4"/>
+                </a:solidFill>
+                <a:latin typeface="LM Sans 10"/>
+                <a:cs typeface="LM Sans 10"/>
+              </a:rPr>
+              <a:t>Algorithm</a:t>
+            </a:r>
+            <a:r>
+              <a:rPr sz="1200" b="1" spc="-50" dirty="0">
+                <a:solidFill>
+                  <a:srgbClr val="0168B4"/>
+                </a:solidFill>
+                <a:latin typeface="LM Sans 10"/>
+                <a:cs typeface="LM Sans 10"/>
+              </a:rPr>
+              <a:t> </a:t>
+            </a:r>
+            <a:r>
+              <a:rPr sz="1200" b="1" spc="-10" dirty="0">
+                <a:solidFill>
+                  <a:srgbClr val="0168B4"/>
+                </a:solidFill>
+                <a:latin typeface="LM Sans 10"/>
+                <a:cs typeface="LM Sans 10"/>
+              </a:rPr>
+              <a:t>(Agrawal</a:t>
+            </a:r>
+            <a:r>
+              <a:rPr sz="1200" b="1" spc="-55" dirty="0">
+                <a:solidFill>
+                  <a:srgbClr val="0168B4"/>
+                </a:solidFill>
+                <a:latin typeface="LM Sans 10"/>
+                <a:cs typeface="LM Sans 10"/>
+              </a:rPr>
+              <a:t> </a:t>
+            </a:r>
+            <a:r>
+              <a:rPr sz="1200" b="1" dirty="0">
+                <a:solidFill>
+                  <a:srgbClr val="0168B4"/>
+                </a:solidFill>
+                <a:latin typeface="LM Sans 10"/>
+                <a:cs typeface="LM Sans 10"/>
+              </a:rPr>
+              <a:t>et</a:t>
+            </a:r>
+            <a:r>
+              <a:rPr sz="1200" b="1" spc="-50" dirty="0">
+                <a:solidFill>
+                  <a:srgbClr val="0168B4"/>
+                </a:solidFill>
+                <a:latin typeface="LM Sans 10"/>
+                <a:cs typeface="LM Sans 10"/>
+              </a:rPr>
+              <a:t> </a:t>
+            </a:r>
+            <a:r>
+              <a:rPr sz="1200" b="1" dirty="0">
+                <a:solidFill>
+                  <a:srgbClr val="0168B4"/>
+                </a:solidFill>
+                <a:latin typeface="LM Sans 10"/>
+                <a:cs typeface="LM Sans 10"/>
+              </a:rPr>
+              <a:t>al.,</a:t>
+            </a:r>
+            <a:r>
+              <a:rPr sz="1200" b="1" spc="-50" dirty="0">
+                <a:solidFill>
+                  <a:srgbClr val="0168B4"/>
+                </a:solidFill>
+                <a:latin typeface="LM Sans 10"/>
+                <a:cs typeface="LM Sans 10"/>
+              </a:rPr>
+              <a:t> </a:t>
+            </a:r>
+            <a:r>
+              <a:rPr sz="1200" b="1" spc="-10" dirty="0">
+                <a:solidFill>
+                  <a:srgbClr val="0168B4"/>
+                </a:solidFill>
+                <a:latin typeface="LM Sans 10"/>
+                <a:cs typeface="LM Sans 10"/>
+              </a:rPr>
+              <a:t>1996)</a:t>
+            </a:r>
+            <a:endParaRPr sz="1200">
+              <a:latin typeface="LM Sans 10"/>
+              <a:cs typeface="LM Sans 10"/>
+            </a:endParaRPr>
+          </a:p>
+        </p:txBody>
+      </p:sp>
+      <p:sp>
+        <p:nvSpPr>
+          <p:cNvPr id="29" name="object 29"/>
+          <p:cNvSpPr/>
+          <p:nvPr/>
+        </p:nvSpPr>
+        <p:spPr>
+          <a:xfrm>
+            <a:off x="0" y="3117684"/>
+            <a:ext cx="5760085" cy="122555"/>
+          </a:xfrm>
+          <a:custGeom>
+            <a:avLst/>
+            <a:gdLst/>
+            <a:ahLst/>
+            <a:cxnLst/>
+            <a:rect l="l" t="t" r="r" b="b"/>
+            <a:pathLst>
+              <a:path w="5760085" h="122555">
+                <a:moveTo>
+                  <a:pt x="5759996" y="0"/>
+                </a:moveTo>
+                <a:lnTo>
+                  <a:pt x="0" y="0"/>
+                </a:lnTo>
+                <a:lnTo>
+                  <a:pt x="0" y="122313"/>
+                </a:lnTo>
+                <a:lnTo>
+                  <a:pt x="5759996" y="122313"/>
+                </a:lnTo>
+                <a:lnTo>
+                  <a:pt x="5759996" y="0"/>
+                </a:lnTo>
+                <a:close/>
+              </a:path>
+            </a:pathLst>
+          </a:custGeom>
+          <a:solidFill>
+            <a:srgbClr val="E6CA5A"/>
+          </a:solidFill>
+        </p:spPr>
+        <p:txBody>
+          <a:bodyPr wrap="square" lIns="0" tIns="0" rIns="0" bIns="0" rtlCol="0"/>
+          <a:lstStyle/>
+          <a:p>
+            <a:endParaRPr/>
+          </a:p>
+        </p:txBody>
+      </p:sp>
+      <p:sp>
+        <p:nvSpPr>
+          <p:cNvPr id="30" name="object 30"/>
+          <p:cNvSpPr txBox="1"/>
+          <p:nvPr/>
+        </p:nvSpPr>
+        <p:spPr>
+          <a:xfrm>
+            <a:off x="95300" y="3131566"/>
+            <a:ext cx="973455" cy="102235"/>
+          </a:xfrm>
+          <a:prstGeom prst="rect">
+            <a:avLst/>
+          </a:prstGeom>
+        </p:spPr>
+        <p:txBody>
+          <a:bodyPr vert="horz" wrap="square" lIns="0" tIns="0" rIns="0" bIns="0" rtlCol="0">
+            <a:spAutoFit/>
+          </a:bodyPr>
+          <a:lstStyle/>
+          <a:p>
+            <a:pPr marL="12700">
+              <a:lnSpc>
+                <a:spcPts val="675"/>
+              </a:lnSpc>
+            </a:pPr>
+            <a:r>
+              <a:rPr sz="600" dirty="0">
+                <a:solidFill>
+                  <a:srgbClr val="FFFFFF"/>
+                </a:solidFill>
+                <a:latin typeface="LM Sans 8"/>
+                <a:cs typeface="LM Sans 8"/>
+                <a:hlinkClick r:id="rId6" action="ppaction://hlinksldjump"/>
+              </a:rPr>
+              <a:t>CSE</a:t>
+            </a:r>
+            <a:r>
+              <a:rPr sz="600" spc="-10" dirty="0">
+                <a:solidFill>
+                  <a:srgbClr val="FFFFFF"/>
+                </a:solidFill>
+                <a:latin typeface="LM Sans 8"/>
+                <a:cs typeface="LM Sans 8"/>
+                <a:hlinkClick r:id="rId6" action="ppaction://hlinksldjump"/>
+              </a:rPr>
+              <a:t> </a:t>
+            </a:r>
+            <a:r>
+              <a:rPr sz="600" dirty="0">
+                <a:solidFill>
+                  <a:srgbClr val="FFFFFF"/>
+                </a:solidFill>
+                <a:latin typeface="LM Sans 8"/>
+                <a:cs typeface="LM Sans 8"/>
+                <a:hlinkClick r:id="rId6" action="ppaction://hlinksldjump"/>
+              </a:rPr>
+              <a:t>411:</a:t>
+            </a:r>
+            <a:r>
+              <a:rPr sz="600" spc="65" dirty="0">
+                <a:solidFill>
+                  <a:srgbClr val="FFFFFF"/>
+                </a:solidFill>
+                <a:latin typeface="LM Sans 8"/>
+                <a:cs typeface="LM Sans 8"/>
+                <a:hlinkClick r:id="rId6" action="ppaction://hlinksldjump"/>
+              </a:rPr>
+              <a:t> </a:t>
+            </a:r>
+            <a:r>
+              <a:rPr sz="600" dirty="0">
+                <a:solidFill>
+                  <a:srgbClr val="FFFFFF"/>
+                </a:solidFill>
+                <a:latin typeface="LM Sans 8"/>
+                <a:cs typeface="LM Sans 8"/>
+                <a:hlinkClick r:id="rId6" action="ppaction://hlinksldjump"/>
+              </a:rPr>
+              <a:t>Machine</a:t>
+            </a:r>
+            <a:r>
+              <a:rPr sz="600" spc="-5" dirty="0">
+                <a:solidFill>
+                  <a:srgbClr val="FFFFFF"/>
+                </a:solidFill>
+                <a:latin typeface="LM Sans 8"/>
+                <a:cs typeface="LM Sans 8"/>
+                <a:hlinkClick r:id="rId6" action="ppaction://hlinksldjump"/>
+              </a:rPr>
+              <a:t> </a:t>
+            </a:r>
+            <a:r>
+              <a:rPr sz="600" spc="-10" dirty="0">
+                <a:solidFill>
+                  <a:srgbClr val="FFFFFF"/>
+                </a:solidFill>
+                <a:latin typeface="LM Sans 8"/>
+                <a:cs typeface="LM Sans 8"/>
+                <a:hlinkClick r:id="rId6" action="ppaction://hlinksldjump"/>
+              </a:rPr>
+              <a:t>Learning</a:t>
+            </a:r>
+            <a:endParaRPr sz="600">
+              <a:latin typeface="LM Sans 8"/>
+              <a:cs typeface="LM Sans 8"/>
+            </a:endParaRPr>
+          </a:p>
+        </p:txBody>
+      </p:sp>
+      <p:sp>
+        <p:nvSpPr>
+          <p:cNvPr id="31" name="object 31"/>
+          <p:cNvSpPr txBox="1">
+            <a:spLocks noGrp="1"/>
+          </p:cNvSpPr>
+          <p:nvPr>
+            <p:ph type="ftr" sz="quarter" idx="5"/>
+          </p:nvPr>
+        </p:nvSpPr>
+        <p:spPr>
+          <a:prstGeom prst="rect">
+            <a:avLst/>
+          </a:prstGeom>
+        </p:spPr>
+        <p:txBody>
+          <a:bodyPr vert="horz" wrap="square" lIns="0" tIns="0" rIns="0" bIns="0" rtlCol="0">
+            <a:spAutoFit/>
+          </a:bodyPr>
+          <a:lstStyle/>
+          <a:p>
+            <a:pPr marL="12700">
+              <a:lnSpc>
+                <a:spcPts val="685"/>
+              </a:lnSpc>
+            </a:pPr>
+            <a:r>
+              <a:rPr dirty="0"/>
+              <a:t>Dr</a:t>
+            </a:r>
+            <a:r>
+              <a:rPr spc="-25" dirty="0"/>
+              <a:t> </a:t>
+            </a:r>
+            <a:r>
+              <a:rPr dirty="0"/>
+              <a:t>Muhammad</a:t>
+            </a:r>
+            <a:r>
+              <a:rPr spc="-20" dirty="0"/>
+              <a:t> </a:t>
+            </a:r>
+            <a:r>
+              <a:rPr dirty="0"/>
+              <a:t>Abul</a:t>
+            </a:r>
+            <a:r>
+              <a:rPr spc="-25" dirty="0"/>
+              <a:t> </a:t>
+            </a:r>
+            <a:r>
+              <a:rPr spc="-10" dirty="0"/>
+              <a:t>Hasan</a:t>
+            </a:r>
+          </a:p>
+        </p:txBody>
+      </p:sp>
+      <p:sp>
+        <p:nvSpPr>
+          <p:cNvPr id="32" name="object 28">
+            <a:extLst>
+              <a:ext uri="{FF2B5EF4-FFF2-40B4-BE49-F238E27FC236}">
+                <a16:creationId xmlns:a16="http://schemas.microsoft.com/office/drawing/2014/main" id="{198D3B20-ED56-41AF-B6B0-36C00FC4514E}"/>
+              </a:ext>
+            </a:extLst>
+          </p:cNvPr>
+          <p:cNvSpPr txBox="1"/>
+          <p:nvPr/>
+        </p:nvSpPr>
+        <p:spPr>
+          <a:xfrm>
+            <a:off x="335610" y="1304715"/>
+            <a:ext cx="4845050" cy="545021"/>
+          </a:xfrm>
+          <a:prstGeom prst="rect">
+            <a:avLst/>
+          </a:prstGeom>
+        </p:spPr>
+        <p:txBody>
+          <a:bodyPr vert="horz" wrap="square" lIns="0" tIns="11430" rIns="0" bIns="0" rtlCol="0">
+            <a:spAutoFit/>
+          </a:bodyPr>
+          <a:lstStyle/>
+          <a:p>
+            <a:pPr marL="187960" indent="-175260">
+              <a:lnSpc>
+                <a:spcPct val="100000"/>
+              </a:lnSpc>
+              <a:spcBef>
+                <a:spcPts val="90"/>
+              </a:spcBef>
+              <a:buClr>
+                <a:srgbClr val="DCB413"/>
+              </a:buClr>
+              <a:buFont typeface="Arial"/>
+              <a:buChar char="■"/>
+              <a:tabLst>
+                <a:tab pos="187960" algn="l"/>
+              </a:tabLst>
+            </a:pPr>
+            <a:r>
+              <a:rPr lang="en-US" sz="1100" dirty="0">
+                <a:latin typeface="Georgia"/>
+                <a:cs typeface="Georgia"/>
+              </a:rPr>
+              <a:t>Reference:</a:t>
+            </a:r>
+          </a:p>
+          <a:p>
+            <a:pPr marL="12700">
+              <a:lnSpc>
+                <a:spcPct val="100000"/>
+              </a:lnSpc>
+              <a:spcBef>
+                <a:spcPts val="90"/>
+              </a:spcBef>
+              <a:buClr>
+                <a:srgbClr val="DCB413"/>
+              </a:buClr>
+              <a:tabLst>
+                <a:tab pos="187960" algn="l"/>
+              </a:tabLst>
+            </a:pPr>
+            <a:r>
+              <a:rPr lang="en-US" sz="1100" dirty="0">
+                <a:latin typeface="Georgia"/>
+                <a:cs typeface="Georgia"/>
+              </a:rPr>
+              <a:t>		</a:t>
+            </a:r>
+            <a:r>
+              <a:rPr lang="en-US" sz="1100" dirty="0">
+                <a:latin typeface="Georgia"/>
+                <a:cs typeface="Georgia"/>
+                <a:hlinkClick r:id="rId7"/>
+              </a:rPr>
+              <a:t>https://www.youtube.com/watch?v=WCK09hVXI9M&amp;t=46s</a:t>
+            </a:r>
+            <a:endParaRPr lang="en-US" sz="1100" dirty="0">
+              <a:latin typeface="Georgia"/>
+              <a:cs typeface="Georgia"/>
+            </a:endParaRPr>
+          </a:p>
+          <a:p>
+            <a:pPr marL="12700">
+              <a:lnSpc>
+                <a:spcPct val="100000"/>
+              </a:lnSpc>
+              <a:spcBef>
+                <a:spcPts val="90"/>
+              </a:spcBef>
+              <a:buClr>
+                <a:srgbClr val="DCB413"/>
+              </a:buClr>
+              <a:tabLst>
+                <a:tab pos="187960" algn="l"/>
+              </a:tabLst>
+            </a:pPr>
+            <a:r>
+              <a:rPr lang="en-US" sz="1100" dirty="0">
+                <a:latin typeface="Georgia"/>
+                <a:cs typeface="Georgia"/>
+              </a:rPr>
+              <a:t>		</a:t>
+            </a:r>
+            <a:r>
+              <a:rPr lang="en-US" sz="1100" dirty="0">
+                <a:latin typeface="Georgia"/>
+                <a:cs typeface="Georgia"/>
+                <a:hlinkClick r:id="rId8"/>
+              </a:rPr>
+              <a:t>https://www.youtube.com/watch?v=IVlfuA4LdrU</a:t>
+            </a:r>
+            <a:endParaRPr sz="1100" dirty="0">
+              <a:latin typeface="Georgia"/>
+              <a:cs typeface="Georgia"/>
+            </a:endParaRPr>
+          </a:p>
+        </p:txBody>
+      </p:sp>
+    </p:spTree>
+    <p:extLst>
+      <p:ext uri="{BB962C8B-B14F-4D97-AF65-F5344CB8AC3E}">
+        <p14:creationId xmlns:p14="http://schemas.microsoft.com/office/powerpoint/2010/main" val="4031032020"/>
+      </p:ext>
+    </p:extLst>
+  </p:cSld>
+  <p:clrMapOvr>
+    <a:masterClrMapping/>
+  </p:clrMapOvr>
+  <p:transition>
+    <p:cut/>
+  </p:transition>
+</p:sld>
+</file>
+
+<file path=ppt/slides/slide31.xml><?xml version="1.0" encoding="utf-8"?>
 <p:sld xmlns:a="http://schemas.openxmlformats.org/drawingml/2006/main" xmlns:r="http://schemas.openxmlformats.org/officeDocument/2006/relationships" xmlns:p="http://schemas.openxmlformats.org/presentationml/2006/main" showMasterSp="0">
   <p:cSld>
     <p:spTree>

</xml_diff>